<commit_message>
zmiany w 03 i 04
</commit_message>
<xml_diff>
--- a/03-WebTechnologies/Excercises.pptx
+++ b/03-WebTechnologies/Excercises.pptx
@@ -247,7 +247,7 @@
           <a:p>
             <a:fld id="{C106EF3D-C2A7-4690-80C8-C2473A856193}" type="datetimeFigureOut">
               <a:rPr lang="pl-PL" smtClean="0"/>
-              <a:t>2019-11-05</a:t>
+              <a:t>2019-11-23</a:t>
             </a:fld>
             <a:endParaRPr lang="pl-PL" dirty="0"/>
           </a:p>
@@ -412,7 +412,7 @@
           <a:p>
             <a:fld id="{85D68E81-03CD-43A1-B18B-BEB6B9439387}" type="datetimeFigureOut">
               <a:rPr lang="pl-PL" smtClean="0"/>
-              <a:t>2019-11-05</a:t>
+              <a:t>2019-11-23</a:t>
             </a:fld>
             <a:endParaRPr lang="pl-PL" dirty="0"/>
           </a:p>
@@ -976,7 +976,7 @@
           <a:p>
             <a:fld id="{F26B3061-B9B7-461F-AB67-5D66A3ABCDA5}" type="datetime1">
               <a:rPr lang="pl-PL" smtClean="0"/>
-              <a:t>2019-11-05</a:t>
+              <a:t>2019-11-23</a:t>
             </a:fld>
             <a:endParaRPr lang="pl-PL" dirty="0"/>
           </a:p>
@@ -1251,7 +1251,7 @@
           <a:p>
             <a:fld id="{A2ADAE54-1728-4B6D-BEF4-D2AEA4F8114E}" type="datetime1">
               <a:rPr lang="pl-PL" smtClean="0"/>
-              <a:t>2019-11-05</a:t>
+              <a:t>2019-11-23</a:t>
             </a:fld>
             <a:endParaRPr lang="pl-PL" dirty="0"/>
           </a:p>
@@ -1503,7 +1503,7 @@
           <a:p>
             <a:fld id="{919C3B4F-179D-44ED-90DF-E8739DC8608F}" type="datetime1">
               <a:rPr lang="pl-PL" smtClean="0"/>
-              <a:t>2019-11-05</a:t>
+              <a:t>2019-11-23</a:t>
             </a:fld>
             <a:endParaRPr lang="pl-PL" dirty="0"/>
           </a:p>
@@ -1671,7 +1671,7 @@
           <a:p>
             <a:fld id="{10A2297D-8C4B-4C5B-B66E-47E601842B03}" type="datetime1">
               <a:rPr lang="pl-PL" smtClean="0"/>
-              <a:t>2019-11-05</a:t>
+              <a:t>2019-11-23</a:t>
             </a:fld>
             <a:endParaRPr lang="pl-PL" dirty="0"/>
           </a:p>
@@ -1849,7 +1849,7 @@
           <a:p>
             <a:fld id="{94B42B50-113C-45E3-9231-B66C297B394E}" type="datetime1">
               <a:rPr lang="pl-PL" smtClean="0"/>
-              <a:t>2019-11-05</a:t>
+              <a:t>2019-11-23</a:t>
             </a:fld>
             <a:endParaRPr lang="pl-PL" dirty="0"/>
           </a:p>
@@ -2006,7 +2006,7 @@
           <a:p>
             <a:fld id="{9549FAE5-AB97-492F-ADAE-06E72624D9F3}" type="datetime1">
               <a:rPr lang="pl-PL" smtClean="0"/>
-              <a:t>2019-11-05</a:t>
+              <a:t>2019-11-23</a:t>
             </a:fld>
             <a:endParaRPr lang="pl-PL" dirty="0"/>
           </a:p>
@@ -2194,7 +2194,7 @@
           <a:p>
             <a:fld id="{9549FAE5-AB97-492F-ADAE-06E72624D9F3}" type="datetime1">
               <a:rPr lang="pl-PL" smtClean="0"/>
-              <a:t>2019-11-05</a:t>
+              <a:t>2019-11-23</a:t>
             </a:fld>
             <a:endParaRPr lang="pl-PL" dirty="0"/>
           </a:p>
@@ -2381,7 +2381,7 @@
           <a:p>
             <a:fld id="{9549FAE5-AB97-492F-ADAE-06E72624D9F3}" type="datetime1">
               <a:rPr lang="pl-PL" smtClean="0"/>
-              <a:t>2019-11-05</a:t>
+              <a:t>2019-11-23</a:t>
             </a:fld>
             <a:endParaRPr lang="pl-PL" dirty="0"/>
           </a:p>
@@ -2653,7 +2653,7 @@
           <a:p>
             <a:fld id="{ED0EDA0A-F020-4B01-AF63-E290248EFD6B}" type="datetime1">
               <a:rPr lang="pl-PL" smtClean="0"/>
-              <a:t>2019-11-05</a:t>
+              <a:t>2019-11-23</a:t>
             </a:fld>
             <a:endParaRPr lang="pl-PL" dirty="0"/>
           </a:p>
@@ -2909,7 +2909,7 @@
           <a:p>
             <a:fld id="{8B752FBA-2CC8-4F32-B36A-B6E16B4A5C14}" type="datetime1">
               <a:rPr lang="pl-PL" smtClean="0"/>
-              <a:t>2019-11-05</a:t>
+              <a:t>2019-11-23</a:t>
             </a:fld>
             <a:endParaRPr lang="pl-PL" dirty="0"/>
           </a:p>
@@ -3295,7 +3295,7 @@
           <a:p>
             <a:fld id="{3B7BA32A-B79B-42FE-906A-2593AD6A7FCC}" type="datetime1">
               <a:rPr lang="pl-PL" smtClean="0"/>
-              <a:t>2019-11-05</a:t>
+              <a:t>2019-11-23</a:t>
             </a:fld>
             <a:endParaRPr lang="pl-PL" dirty="0"/>
           </a:p>
@@ -3417,7 +3417,7 @@
           <a:p>
             <a:fld id="{3E28EDCB-CC2B-4C70-B921-DD5382BD4849}" type="datetime1">
               <a:rPr lang="pl-PL" smtClean="0"/>
-              <a:t>2019-11-05</a:t>
+              <a:t>2019-11-23</a:t>
             </a:fld>
             <a:endParaRPr lang="pl-PL" dirty="0"/>
           </a:p>
@@ -3512,7 +3512,7 @@
           <a:p>
             <a:fld id="{E960CF9B-2F8C-4614-93FE-75BD5748BF99}" type="datetime1">
               <a:rPr lang="pl-PL" smtClean="0"/>
-              <a:t>2019-11-05</a:t>
+              <a:t>2019-11-23</a:t>
             </a:fld>
             <a:endParaRPr lang="pl-PL" dirty="0"/>
           </a:p>
@@ -3728,7 +3728,7 @@
           <a:p>
             <a:fld id="{8F276EAB-4011-4C81-ACEC-B79731A9A244}" type="datetime1">
               <a:rPr lang="pl-PL" smtClean="0"/>
-              <a:t>2019-11-05</a:t>
+              <a:t>2019-11-23</a:t>
             </a:fld>
             <a:endParaRPr lang="pl-PL" dirty="0"/>
           </a:p>
@@ -6585,8 +6585,40 @@
           <a:lstStyle/>
           <a:p>
             <a:r>
+              <a:rPr lang="pl-PL" dirty="0" err="1"/>
+              <a:t>Create</a:t>
+            </a:r>
+            <a:r>
+              <a:rPr lang="pl-PL" dirty="0"/>
+              <a:t> a five-element </a:t>
+            </a:r>
+            <a:r>
+              <a:rPr lang="pl-PL" dirty="0" err="1"/>
+              <a:t>array</a:t>
+            </a:r>
+            <a:r>
+              <a:rPr lang="pl-PL" dirty="0"/>
+              <a:t> </a:t>
+            </a:r>
+            <a:r>
+              <a:rPr lang="pl-PL" dirty="0" err="1"/>
+              <a:t>which</a:t>
+            </a:r>
+            <a:r>
+              <a:rPr lang="pl-PL" dirty="0"/>
+              <a:t> </a:t>
+            </a:r>
+            <a:r>
+              <a:rPr lang="pl-PL" dirty="0" err="1"/>
+              <a:t>contains</a:t>
+            </a:r>
+            <a:r>
+              <a:rPr lang="pl-PL" dirty="0"/>
+              <a:t> </a:t>
+            </a:r>
+            <a:r>
               <a:rPr lang="en-US" dirty="0"/>
-              <a:t>An array of 5 elements includes random integers in the range of 1 to 5. To create a random number, use </a:t>
+              <a:t>random integers in the range of 1 to 5. To create a random number, use </a:t>
             </a:r>
             <a:r>
               <a:rPr lang="en-US" dirty="0" err="1">
@@ -6608,7 +6640,15 @@
           <a:p>
             <a:r>
               <a:rPr lang="en-US" dirty="0"/>
-              <a:t>Check whether the array is sorted, i.e. each element of the array is not smaller than its predecessor.</a:t>
+              <a:t>Check whether the array is </a:t>
+            </a:r>
+            <a:r>
+              <a:rPr lang="pl-PL" dirty="0" err="1"/>
+              <a:t>ordered</a:t>
+            </a:r>
+            <a:r>
+              <a:rPr lang="en-US" dirty="0"/>
+              <a:t>, i.e. each element of the array is not smaller than its predecessor.</a:t>
             </a:r>
           </a:p>
           <a:p>

</xml_diff>